<commit_message>
Minha opinião das cenas já feitas
</commit_message>
<xml_diff>
--- a/Presentation/Logística Urbana para Entrega de Mercadorias.pptx
+++ b/Presentation/Logística Urbana para Entrega de Mercadorias.pptx
@@ -8,13 +8,15 @@
     <p:sldId id="256" r:id="rId2"/>
     <p:sldId id="257" r:id="rId3"/>
     <p:sldId id="258" r:id="rId4"/>
-    <p:sldId id="267" r:id="rId5"/>
-    <p:sldId id="266" r:id="rId6"/>
-    <p:sldId id="268" r:id="rId7"/>
-    <p:sldId id="262" r:id="rId8"/>
-    <p:sldId id="263" r:id="rId9"/>
-    <p:sldId id="264" r:id="rId10"/>
-    <p:sldId id="265" r:id="rId11"/>
+    <p:sldId id="269" r:id="rId5"/>
+    <p:sldId id="267" r:id="rId6"/>
+    <p:sldId id="270" r:id="rId7"/>
+    <p:sldId id="266" r:id="rId8"/>
+    <p:sldId id="268" r:id="rId9"/>
+    <p:sldId id="262" r:id="rId10"/>
+    <p:sldId id="263" r:id="rId11"/>
+    <p:sldId id="264" r:id="rId12"/>
+    <p:sldId id="265" r:id="rId13"/>
   </p:sldIdLst>
   <p:sldSz cx="12192000" cy="6858000"/>
   <p:notesSz cx="6858000" cy="9144000"/>
@@ -119,6 +121,209 @@
     </p:ext>
   </p:extLst>
 </p:presentation>
+</file>
+
+<file path=ppt/revisionInfo.xml><?xml version="1.0" encoding="utf-8"?>
+<p1510:revInfo xmlns:a="http://schemas.openxmlformats.org/drawingml/2006/main" xmlns:r="http://schemas.openxmlformats.org/officeDocument/2006/relationships" xmlns:p1510="http://schemas.microsoft.com/office/powerpoint/2015/10/main">
+  <p1510:revLst>
+    <p1510:client id="{F2BC9C48-AE67-4E7B-9201-C4EDBE223694}" v="14" dt="2022-04-13T22:51:58.499"/>
+  </p1510:revLst>
+</p1510:revInfo>
+</file>
+
+<file path=ppt/changesInfos/changesInfo1.xml><?xml version="1.0" encoding="utf-8"?>
+<pc:chgInfo xmlns:a="http://schemas.openxmlformats.org/drawingml/2006/main" xmlns:r="http://schemas.openxmlformats.org/officeDocument/2006/relationships" xmlns:ac="http://schemas.microsoft.com/office/drawing/2013/main/command" xmlns:pc="http://schemas.microsoft.com/office/powerpoint/2013/main/command">
+  <pc:docChgLst>
+    <pc:chgData name="pedro correia" userId="6e7638e249dbe376" providerId="LiveId" clId="{F2BC9C48-AE67-4E7B-9201-C4EDBE223694}"/>
+    <pc:docChg chg="undo custSel addSld modSld">
+      <pc:chgData name="pedro correia" userId="6e7638e249dbe376" providerId="LiveId" clId="{F2BC9C48-AE67-4E7B-9201-C4EDBE223694}" dt="2022-04-13T22:52:14.223" v="62" actId="20577"/>
+      <pc:docMkLst>
+        <pc:docMk/>
+      </pc:docMkLst>
+      <pc:sldChg chg="addSp delSp modSp mod">
+        <pc:chgData name="pedro correia" userId="6e7638e249dbe376" providerId="LiveId" clId="{F2BC9C48-AE67-4E7B-9201-C4EDBE223694}" dt="2022-04-13T22:50:34.664" v="43"/>
+        <pc:sldMkLst>
+          <pc:docMk/>
+          <pc:sldMk cId="2921346457" sldId="258"/>
+        </pc:sldMkLst>
+        <pc:spChg chg="add del mod">
+          <ac:chgData name="pedro correia" userId="6e7638e249dbe376" providerId="LiveId" clId="{F2BC9C48-AE67-4E7B-9201-C4EDBE223694}" dt="2022-04-13T22:50:34.664" v="43"/>
+          <ac:spMkLst>
+            <pc:docMk/>
+            <pc:sldMk cId="2921346457" sldId="258"/>
+            <ac:spMk id="3" creationId="{0DA53B97-5997-490C-B21F-AEAD1D079AC5}"/>
+          </ac:spMkLst>
+        </pc:spChg>
+        <pc:spChg chg="add del mod">
+          <ac:chgData name="pedro correia" userId="6e7638e249dbe376" providerId="LiveId" clId="{F2BC9C48-AE67-4E7B-9201-C4EDBE223694}" dt="2022-04-13T22:50:32.553" v="35" actId="6549"/>
+          <ac:spMkLst>
+            <pc:docMk/>
+            <pc:sldMk cId="2921346457" sldId="258"/>
+            <ac:spMk id="4" creationId="{84452BBA-73B4-4AF6-A2C7-1BB8D1E572F8}"/>
+          </ac:spMkLst>
+        </pc:spChg>
+        <pc:spChg chg="add del mod">
+          <ac:chgData name="pedro correia" userId="6e7638e249dbe376" providerId="LiveId" clId="{F2BC9C48-AE67-4E7B-9201-C4EDBE223694}" dt="2022-04-13T22:49:16.802" v="3"/>
+          <ac:spMkLst>
+            <pc:docMk/>
+            <pc:sldMk cId="2921346457" sldId="258"/>
+            <ac:spMk id="5" creationId="{F2D59DEC-868C-459A-9C44-DF61B889D3F3}"/>
+          </ac:spMkLst>
+        </pc:spChg>
+        <pc:spChg chg="add del mod">
+          <ac:chgData name="pedro correia" userId="6e7638e249dbe376" providerId="LiveId" clId="{F2BC9C48-AE67-4E7B-9201-C4EDBE223694}" dt="2022-04-13T22:49:34.528" v="15" actId="478"/>
+          <ac:spMkLst>
+            <pc:docMk/>
+            <pc:sldMk cId="2921346457" sldId="258"/>
+            <ac:spMk id="7" creationId="{E2D87BF1-9A41-4344-9550-D9EBDBCE0ED3}"/>
+          </ac:spMkLst>
+        </pc:spChg>
+        <pc:spChg chg="add del mod">
+          <ac:chgData name="pedro correia" userId="6e7638e249dbe376" providerId="LiveId" clId="{F2BC9C48-AE67-4E7B-9201-C4EDBE223694}" dt="2022-04-13T22:49:25.639" v="10"/>
+          <ac:spMkLst>
+            <pc:docMk/>
+            <pc:sldMk cId="2921346457" sldId="258"/>
+            <ac:spMk id="8" creationId="{2E2C0228-E437-40AA-BE52-8EDBFB32031D}"/>
+          </ac:spMkLst>
+        </pc:spChg>
+        <pc:spChg chg="add del mod">
+          <ac:chgData name="pedro correia" userId="6e7638e249dbe376" providerId="LiveId" clId="{F2BC9C48-AE67-4E7B-9201-C4EDBE223694}" dt="2022-04-13T22:49:33.737" v="14"/>
+          <ac:spMkLst>
+            <pc:docMk/>
+            <pc:sldMk cId="2921346457" sldId="258"/>
+            <ac:spMk id="9" creationId="{D47A28DB-133E-49D3-834C-7C509E7A3BDB}"/>
+          </ac:spMkLst>
+        </pc:spChg>
+        <pc:spChg chg="add del mod">
+          <ac:chgData name="pedro correia" userId="6e7638e249dbe376" providerId="LiveId" clId="{F2BC9C48-AE67-4E7B-9201-C4EDBE223694}" dt="2022-04-13T22:50:32.962" v="37"/>
+          <ac:spMkLst>
+            <pc:docMk/>
+            <pc:sldMk cId="2921346457" sldId="258"/>
+            <ac:spMk id="10" creationId="{03A4D749-6CDB-4634-BB5E-949C83EA9A18}"/>
+          </ac:spMkLst>
+        </pc:spChg>
+        <pc:spChg chg="add del mod">
+          <ac:chgData name="pedro correia" userId="6e7638e249dbe376" providerId="LiveId" clId="{F2BC9C48-AE67-4E7B-9201-C4EDBE223694}" dt="2022-04-13T22:50:09.868" v="28"/>
+          <ac:spMkLst>
+            <pc:docMk/>
+            <pc:sldMk cId="2921346457" sldId="258"/>
+            <ac:spMk id="11" creationId="{CA985A11-877D-4BAD-9552-D3A67BE32D18}"/>
+          </ac:spMkLst>
+        </pc:spChg>
+        <pc:spChg chg="add del mod">
+          <ac:chgData name="pedro correia" userId="6e7638e249dbe376" providerId="LiveId" clId="{F2BC9C48-AE67-4E7B-9201-C4EDBE223694}" dt="2022-04-13T22:50:31.766" v="32"/>
+          <ac:spMkLst>
+            <pc:docMk/>
+            <pc:sldMk cId="2921346457" sldId="258"/>
+            <ac:spMk id="12" creationId="{64CEAE14-EB6D-4F96-8452-FCA8FBB0E7C5}"/>
+          </ac:spMkLst>
+        </pc:spChg>
+      </pc:sldChg>
+      <pc:sldChg chg="addSp delSp modSp new mod">
+        <pc:chgData name="pedro correia" userId="6e7638e249dbe376" providerId="LiveId" clId="{F2BC9C48-AE67-4E7B-9201-C4EDBE223694}" dt="2022-04-13T22:51:25.576" v="56" actId="1076"/>
+        <pc:sldMkLst>
+          <pc:docMk/>
+          <pc:sldMk cId="1507378260" sldId="269"/>
+        </pc:sldMkLst>
+        <pc:spChg chg="add del">
+          <ac:chgData name="pedro correia" userId="6e7638e249dbe376" providerId="LiveId" clId="{F2BC9C48-AE67-4E7B-9201-C4EDBE223694}" dt="2022-04-13T22:51:00.418" v="50" actId="478"/>
+          <ac:spMkLst>
+            <pc:docMk/>
+            <pc:sldMk cId="1507378260" sldId="269"/>
+            <ac:spMk id="2" creationId="{1EAC21A0-F87D-4D38-B730-1C73B6D841C0}"/>
+          </ac:spMkLst>
+        </pc:spChg>
+        <pc:spChg chg="del mod">
+          <ac:chgData name="pedro correia" userId="6e7638e249dbe376" providerId="LiveId" clId="{F2BC9C48-AE67-4E7B-9201-C4EDBE223694}" dt="2022-04-13T22:51:12.615" v="52" actId="478"/>
+          <ac:spMkLst>
+            <pc:docMk/>
+            <pc:sldMk cId="1507378260" sldId="269"/>
+            <ac:spMk id="3" creationId="{8FA8D177-C65A-45A4-948F-041564D7AD6E}"/>
+          </ac:spMkLst>
+        </pc:spChg>
+        <pc:spChg chg="add mod">
+          <ac:chgData name="pedro correia" userId="6e7638e249dbe376" providerId="LiveId" clId="{F2BC9C48-AE67-4E7B-9201-C4EDBE223694}" dt="2022-04-13T22:50:55.428" v="49" actId="6549"/>
+          <ac:spMkLst>
+            <pc:docMk/>
+            <pc:sldMk cId="1507378260" sldId="269"/>
+            <ac:spMk id="4" creationId="{F29967F0-2C0F-4212-ADA7-2126EE7D643F}"/>
+          </ac:spMkLst>
+        </pc:spChg>
+        <pc:spChg chg="add mod">
+          <ac:chgData name="pedro correia" userId="6e7638e249dbe376" providerId="LiveId" clId="{F2BC9C48-AE67-4E7B-9201-C4EDBE223694}" dt="2022-04-13T22:51:19.785" v="54" actId="1076"/>
+          <ac:spMkLst>
+            <pc:docMk/>
+            <pc:sldMk cId="1507378260" sldId="269"/>
+            <ac:spMk id="5" creationId="{F9671397-9D2B-4B4F-B762-DCAA21974E9D}"/>
+          </ac:spMkLst>
+        </pc:spChg>
+        <pc:spChg chg="add mod">
+          <ac:chgData name="pedro correia" userId="6e7638e249dbe376" providerId="LiveId" clId="{F2BC9C48-AE67-4E7B-9201-C4EDBE223694}" dt="2022-04-13T22:51:23.659" v="55" actId="1076"/>
+          <ac:spMkLst>
+            <pc:docMk/>
+            <pc:sldMk cId="1507378260" sldId="269"/>
+            <ac:spMk id="6" creationId="{33A1A7FD-057F-42F8-9018-4CE31FB92D8D}"/>
+          </ac:spMkLst>
+        </pc:spChg>
+        <pc:spChg chg="add mod">
+          <ac:chgData name="pedro correia" userId="6e7638e249dbe376" providerId="LiveId" clId="{F2BC9C48-AE67-4E7B-9201-C4EDBE223694}" dt="2022-04-13T22:51:25.576" v="56" actId="1076"/>
+          <ac:spMkLst>
+            <pc:docMk/>
+            <pc:sldMk cId="1507378260" sldId="269"/>
+            <ac:spMk id="7" creationId="{0FC99067-2FE4-49FA-A359-140ACF56302F}"/>
+          </ac:spMkLst>
+        </pc:spChg>
+      </pc:sldChg>
+      <pc:sldChg chg="addSp delSp modSp new mod">
+        <pc:chgData name="pedro correia" userId="6e7638e249dbe376" providerId="LiveId" clId="{F2BC9C48-AE67-4E7B-9201-C4EDBE223694}" dt="2022-04-13T22:52:14.223" v="62" actId="20577"/>
+        <pc:sldMkLst>
+          <pc:docMk/>
+          <pc:sldMk cId="2615784666" sldId="270"/>
+        </pc:sldMkLst>
+        <pc:spChg chg="mod">
+          <ac:chgData name="pedro correia" userId="6e7638e249dbe376" providerId="LiveId" clId="{F2BC9C48-AE67-4E7B-9201-C4EDBE223694}" dt="2022-04-13T22:51:52.396" v="59" actId="122"/>
+          <ac:spMkLst>
+            <pc:docMk/>
+            <pc:sldMk cId="2615784666" sldId="270"/>
+            <ac:spMk id="2" creationId="{905083D3-96D5-454B-A94C-2CB33399B9A1}"/>
+          </ac:spMkLst>
+        </pc:spChg>
+        <pc:spChg chg="del">
+          <ac:chgData name="pedro correia" userId="6e7638e249dbe376" providerId="LiveId" clId="{F2BC9C48-AE67-4E7B-9201-C4EDBE223694}" dt="2022-04-13T22:52:01.855" v="61" actId="478"/>
+          <ac:spMkLst>
+            <pc:docMk/>
+            <pc:sldMk cId="2615784666" sldId="270"/>
+            <ac:spMk id="3" creationId="{17B5D8AC-FB83-4BA0-BF1D-9D56C04B86D1}"/>
+          </ac:spMkLst>
+        </pc:spChg>
+        <pc:spChg chg="add mod">
+          <ac:chgData name="pedro correia" userId="6e7638e249dbe376" providerId="LiveId" clId="{F2BC9C48-AE67-4E7B-9201-C4EDBE223694}" dt="2022-04-13T22:52:14.223" v="62" actId="20577"/>
+          <ac:spMkLst>
+            <pc:docMk/>
+            <pc:sldMk cId="2615784666" sldId="270"/>
+            <ac:spMk id="5" creationId="{E0A9D527-AC5E-4F74-BD13-9F33FB55B4CD}"/>
+          </ac:spMkLst>
+        </pc:spChg>
+        <pc:spChg chg="add mod">
+          <ac:chgData name="pedro correia" userId="6e7638e249dbe376" providerId="LiveId" clId="{F2BC9C48-AE67-4E7B-9201-C4EDBE223694}" dt="2022-04-13T22:51:58.499" v="60"/>
+          <ac:spMkLst>
+            <pc:docMk/>
+            <pc:sldMk cId="2615784666" sldId="270"/>
+            <ac:spMk id="6" creationId="{F18A2A3C-591B-40E0-A021-E0F506517821}"/>
+          </ac:spMkLst>
+        </pc:spChg>
+        <pc:picChg chg="add mod">
+          <ac:chgData name="pedro correia" userId="6e7638e249dbe376" providerId="LiveId" clId="{F2BC9C48-AE67-4E7B-9201-C4EDBE223694}" dt="2022-04-13T22:51:58.499" v="60"/>
+          <ac:picMkLst>
+            <pc:docMk/>
+            <pc:sldMk cId="2615784666" sldId="270"/>
+            <ac:picMk id="4" creationId="{61398ADD-0833-45E1-BAC1-4EE31EB7D8D4}"/>
+          </ac:picMkLst>
+        </pc:picChg>
+      </pc:sldChg>
+    </pc:docChg>
+  </pc:docChgLst>
+</pc:chgInfo>
 </file>
 
 <file path=ppt/slideLayouts/slideLayout1.xml><?xml version="1.0" encoding="utf-8"?>
@@ -4047,6 +4252,166 @@
           <p:cNvPr id="2" name="Title 1">
             <a:extLst>
               <a:ext uri="{FF2B5EF4-FFF2-40B4-BE49-F238E27FC236}">
+                <a16:creationId xmlns:a16="http://schemas.microsoft.com/office/drawing/2014/main" id="{8C742769-4AB3-404D-AA45-B0FC74F1E218}"/>
+              </a:ext>
+            </a:extLst>
+          </p:cNvPr>
+          <p:cNvSpPr>
+            <a:spLocks noGrp="1"/>
+          </p:cNvSpPr>
+          <p:nvPr>
+            <p:ph type="title"/>
+          </p:nvPr>
+        </p:nvSpPr>
+        <p:spPr/>
+        <p:txBody>
+          <a:bodyPr/>
+          <a:lstStyle/>
+          <a:p>
+            <a:endParaRPr lang="pt-PT"/>
+          </a:p>
+        </p:txBody>
+      </p:sp>
+      <p:sp>
+        <p:nvSpPr>
+          <p:cNvPr id="3" name="Content Placeholder 2">
+            <a:extLst>
+              <a:ext uri="{FF2B5EF4-FFF2-40B4-BE49-F238E27FC236}">
+                <a16:creationId xmlns:a16="http://schemas.microsoft.com/office/drawing/2014/main" id="{FFF57B6D-ACD6-4568-86FC-6D1AD2A8AE64}"/>
+              </a:ext>
+            </a:extLst>
+          </p:cNvPr>
+          <p:cNvSpPr>
+            <a:spLocks noGrp="1"/>
+          </p:cNvSpPr>
+          <p:nvPr>
+            <p:ph idx="1"/>
+          </p:nvPr>
+        </p:nvSpPr>
+        <p:spPr/>
+        <p:txBody>
+          <a:bodyPr/>
+          <a:lstStyle/>
+          <a:p>
+            <a:endParaRPr lang="pt-PT"/>
+          </a:p>
+        </p:txBody>
+      </p:sp>
+    </p:spTree>
+    <p:extLst>
+      <p:ext uri="{BB962C8B-B14F-4D97-AF65-F5344CB8AC3E}">
+        <p14:creationId xmlns:p14="http://schemas.microsoft.com/office/powerpoint/2010/main" val="3099424196"/>
+      </p:ext>
+    </p:extLst>
+  </p:cSld>
+  <p:clrMapOvr>
+    <a:masterClrMapping/>
+  </p:clrMapOvr>
+</p:sld>
+</file>
+
+<file path=ppt/slides/slide11.xml><?xml version="1.0" encoding="utf-8"?>
+<p:sld xmlns:a="http://schemas.openxmlformats.org/drawingml/2006/main" xmlns:r="http://schemas.openxmlformats.org/officeDocument/2006/relationships" xmlns:p="http://schemas.openxmlformats.org/presentationml/2006/main">
+  <p:cSld>
+    <p:spTree>
+      <p:nvGrpSpPr>
+        <p:cNvPr id="1" name=""/>
+        <p:cNvGrpSpPr/>
+        <p:nvPr/>
+      </p:nvGrpSpPr>
+      <p:grpSpPr>
+        <a:xfrm>
+          <a:off x="0" y="0"/>
+          <a:ext cx="0" cy="0"/>
+          <a:chOff x="0" y="0"/>
+          <a:chExt cx="0" cy="0"/>
+        </a:xfrm>
+      </p:grpSpPr>
+      <p:sp>
+        <p:nvSpPr>
+          <p:cNvPr id="2" name="Title 1">
+            <a:extLst>
+              <a:ext uri="{FF2B5EF4-FFF2-40B4-BE49-F238E27FC236}">
+                <a16:creationId xmlns:a16="http://schemas.microsoft.com/office/drawing/2014/main" id="{C8A0825C-84D6-4913-86C4-FEAC7C00EBAE}"/>
+              </a:ext>
+            </a:extLst>
+          </p:cNvPr>
+          <p:cNvSpPr>
+            <a:spLocks noGrp="1"/>
+          </p:cNvSpPr>
+          <p:nvPr>
+            <p:ph type="title"/>
+          </p:nvPr>
+        </p:nvSpPr>
+        <p:spPr/>
+        <p:txBody>
+          <a:bodyPr/>
+          <a:lstStyle/>
+          <a:p>
+            <a:endParaRPr lang="pt-PT"/>
+          </a:p>
+        </p:txBody>
+      </p:sp>
+      <p:sp>
+        <p:nvSpPr>
+          <p:cNvPr id="3" name="Content Placeholder 2">
+            <a:extLst>
+              <a:ext uri="{FF2B5EF4-FFF2-40B4-BE49-F238E27FC236}">
+                <a16:creationId xmlns:a16="http://schemas.microsoft.com/office/drawing/2014/main" id="{6CD805D1-8B45-4B3A-B122-F9CE64ED77B6}"/>
+              </a:ext>
+            </a:extLst>
+          </p:cNvPr>
+          <p:cNvSpPr>
+            <a:spLocks noGrp="1"/>
+          </p:cNvSpPr>
+          <p:nvPr>
+            <p:ph idx="1"/>
+          </p:nvPr>
+        </p:nvSpPr>
+        <p:spPr/>
+        <p:txBody>
+          <a:bodyPr/>
+          <a:lstStyle/>
+          <a:p>
+            <a:endParaRPr lang="pt-PT"/>
+          </a:p>
+        </p:txBody>
+      </p:sp>
+    </p:spTree>
+    <p:extLst>
+      <p:ext uri="{BB962C8B-B14F-4D97-AF65-F5344CB8AC3E}">
+        <p14:creationId xmlns:p14="http://schemas.microsoft.com/office/powerpoint/2010/main" val="373675569"/>
+      </p:ext>
+    </p:extLst>
+  </p:cSld>
+  <p:clrMapOvr>
+    <a:masterClrMapping/>
+  </p:clrMapOvr>
+</p:sld>
+</file>
+
+<file path=ppt/slides/slide12.xml><?xml version="1.0" encoding="utf-8"?>
+<p:sld xmlns:a="http://schemas.openxmlformats.org/drawingml/2006/main" xmlns:r="http://schemas.openxmlformats.org/officeDocument/2006/relationships" xmlns:p="http://schemas.openxmlformats.org/presentationml/2006/main">
+  <p:cSld>
+    <p:spTree>
+      <p:nvGrpSpPr>
+        <p:cNvPr id="1" name=""/>
+        <p:cNvGrpSpPr/>
+        <p:nvPr/>
+      </p:nvGrpSpPr>
+      <p:grpSpPr>
+        <a:xfrm>
+          <a:off x="0" y="0"/>
+          <a:ext cx="0" cy="0"/>
+          <a:chOff x="0" y="0"/>
+          <a:chExt cx="0" cy="0"/>
+        </a:xfrm>
+      </p:grpSpPr>
+      <p:sp>
+        <p:nvSpPr>
+          <p:cNvPr id="2" name="Title 1">
+            <a:extLst>
+              <a:ext uri="{FF2B5EF4-FFF2-40B4-BE49-F238E27FC236}">
                 <a16:creationId xmlns:a16="http://schemas.microsoft.com/office/drawing/2014/main" id="{85675E86-C724-43AD-A4C4-C2F1CB42BBAE}"/>
               </a:ext>
             </a:extLst>
@@ -4656,7 +5021,15 @@
             </a:pPr>
             <a:r>
               <a:rPr lang="pt-PT" dirty="0"/>
-              <a:t>1 vetor com carrinhas (C),(Vmax,Pmax,Custo,Vatual,Patual)</a:t>
+              <a:t>1 vetor com carrinhas (C),(</a:t>
+            </a:r>
+            <a:r>
+              <a:rPr lang="pt-PT" dirty="0" err="1"/>
+              <a:t>Vmax,Pmax,Custo,Vatual,Patual</a:t>
+            </a:r>
+            <a:r>
+              <a:rPr lang="pt-PT" dirty="0"/>
+              <a:t>)</a:t>
             </a:r>
           </a:p>
           <a:p>
@@ -4712,6 +5085,26 @@
                 <a:latin typeface="Calibri" panose="020F0502020204030204"/>
               </a:rPr>
               <a:t>D</a:t>
+            </a:r>
+            <a:r>
+              <a:rPr kumimoji="0" lang="pt-PT" sz="2000" b="0" i="0" u="none" strike="noStrike" kern="1200" cap="none" spc="0" normalizeH="0" baseline="0" noProof="0" dirty="0" err="1">
+                <a:ln>
+                  <a:noFill/>
+                </a:ln>
+                <a:solidFill>
+                  <a:srgbClr val="000000">
+                    <a:lumMod val="75000"/>
+                    <a:lumOff val="25000"/>
+                  </a:srgbClr>
+                </a:solidFill>
+                <a:effectLst/>
+                <a:uLnTx/>
+                <a:uFillTx/>
+                <a:latin typeface="Calibri" panose="020F0502020204030204"/>
+                <a:ea typeface="+mn-ea"/>
+                <a:cs typeface="+mn-cs"/>
+              </a:rPr>
+              <a:t>ados</a:t>
             </a:r>
             <a:r>
               <a:rPr kumimoji="0" lang="pt-PT" sz="2000" b="0" i="0" u="none" strike="noStrike" kern="1200" cap="none" spc="0" normalizeH="0" baseline="0" noProof="0" dirty="0">
@@ -4731,7 +5124,7 @@
                 <a:ea typeface="+mn-ea"/>
                 <a:cs typeface="+mn-cs"/>
               </a:rPr>
-              <a:t>ados de saída (1º cenário):</a:t>
+              <a:t> de saída (1º cenário):</a:t>
             </a:r>
           </a:p>
           <a:p>
@@ -4812,83 +5205,502 @@
       </p:grpSpPr>
       <p:sp>
         <p:nvSpPr>
-          <p:cNvPr id="2" name="Title 1">
+          <p:cNvPr id="4" name="Title 1">
             <a:extLst>
               <a:ext uri="{FF2B5EF4-FFF2-40B4-BE49-F238E27FC236}">
-                <a16:creationId xmlns:a16="http://schemas.microsoft.com/office/drawing/2014/main" id="{985620E8-013C-4AB0-BBA5-EF61AB90C269}"/>
+                <a16:creationId xmlns:a16="http://schemas.microsoft.com/office/drawing/2014/main" id="{F29967F0-2C0F-4212-ADA7-2126EE7D643F}"/>
               </a:ext>
             </a:extLst>
           </p:cNvPr>
-          <p:cNvSpPr>
-            <a:spLocks noGrp="1"/>
-          </p:cNvSpPr>
-          <p:nvPr>
-            <p:ph type="title"/>
-          </p:nvPr>
-        </p:nvSpPr>
-        <p:spPr/>
-        <p:txBody>
-          <a:bodyPr/>
-          <a:lstStyle/>
+          <p:cNvSpPr txBox="1">
+            <a:spLocks/>
+          </p:cNvSpPr>
+          <p:nvPr/>
+        </p:nvSpPr>
+        <p:spPr>
+          <a:xfrm>
+            <a:off x="1097280" y="286603"/>
+            <a:ext cx="10058400" cy="1450757"/>
+          </a:xfrm>
+          <a:prstGeom prst="rect">
+            <a:avLst/>
+          </a:prstGeom>
+        </p:spPr>
+        <p:txBody>
+          <a:bodyPr vert="horz" lIns="91440" tIns="45720" rIns="91440" bIns="45720" rtlCol="0" anchor="b">
+            <a:normAutofit/>
+          </a:bodyPr>
+          <a:lstStyle>
+            <a:lvl1pPr marL="0" algn="l" defTabSz="914400" rtl="0" eaLnBrk="1" latinLnBrk="0" hangingPunct="1">
+              <a:lnSpc>
+                <a:spcPct val="85000"/>
+              </a:lnSpc>
+              <a:spcBef>
+                <a:spcPct val="0"/>
+              </a:spcBef>
+              <a:buNone/>
+              <a:defRPr sz="4800" kern="1200" spc="-50" baseline="0">
+                <a:solidFill>
+                  <a:schemeClr val="tx1">
+                    <a:lumMod val="75000"/>
+                    <a:lumOff val="25000"/>
+                  </a:schemeClr>
+                </a:solidFill>
+                <a:latin typeface="+mj-lt"/>
+                <a:ea typeface="+mj-ea"/>
+                <a:cs typeface="+mj-cs"/>
+              </a:defRPr>
+            </a:lvl1pPr>
+          </a:lstStyle>
           <a:p>
             <a:pPr algn="ctr"/>
             <a:r>
               <a:rPr lang="en-US" b="1" dirty="0" err="1"/>
-              <a:t>Descrição</a:t>
+              <a:t>Formalização</a:t>
             </a:r>
             <a:r>
               <a:rPr lang="en-US" b="1" dirty="0"/>
-              <a:t> da </a:t>
+              <a:t> do </a:t>
             </a:r>
             <a:r>
               <a:rPr lang="en-US" b="1" dirty="0" err="1"/>
-              <a:t>Solução</a:t>
+              <a:t>Cenário</a:t>
+            </a:r>
+            <a:r>
+              <a:rPr lang="en-US" b="1" dirty="0"/>
+              <a:t> 1</a:t>
             </a:r>
             <a:endParaRPr lang="pt-PT" b="1" dirty="0"/>
           </a:p>
         </p:txBody>
       </p:sp>
-      <p:pic>
-        <p:nvPicPr>
-          <p:cNvPr id="9" name="Content Placeholder 8" descr="Text, letter&#10;&#10;Description automatically generated">
+      <p:sp>
+        <p:nvSpPr>
+          <p:cNvPr id="5" name="Content Placeholder 2">
             <a:extLst>
               <a:ext uri="{FF2B5EF4-FFF2-40B4-BE49-F238E27FC236}">
-                <a16:creationId xmlns:a16="http://schemas.microsoft.com/office/drawing/2014/main" id="{3F81FF3F-F559-47D5-8A02-21FFA47069F2}"/>
+                <a16:creationId xmlns:a16="http://schemas.microsoft.com/office/drawing/2014/main" id="{F9671397-9D2B-4B4F-B762-DCAA21974E9D}"/>
               </a:ext>
             </a:extLst>
           </p:cNvPr>
-          <p:cNvPicPr>
-            <a:picLocks noGrp="1" noChangeAspect="1"/>
-          </p:cNvPicPr>
-          <p:nvPr>
-            <p:ph idx="1"/>
-          </p:nvPr>
-        </p:nvPicPr>
-        <p:blipFill>
-          <a:blip r:embed="rId2">
-            <a:extLst>
-              <a:ext uri="{28A0092B-C50C-407E-A947-70E740481C1C}">
-                <a14:useLocalDpi xmlns:a14="http://schemas.microsoft.com/office/drawing/2010/main" val="0"/>
-              </a:ext>
-            </a:extLst>
-          </a:blip>
-          <a:stretch>
-            <a:fillRect/>
-          </a:stretch>
-        </p:blipFill>
+          <p:cNvSpPr txBox="1">
+            <a:spLocks/>
+          </p:cNvSpPr>
+          <p:nvPr/>
+        </p:nvSpPr>
         <p:spPr>
           <a:xfrm>
-            <a:off x="4147865" y="1961945"/>
-            <a:ext cx="3896269" cy="2934109"/>
+            <a:off x="614867" y="1831086"/>
+            <a:ext cx="5596378" cy="4494299"/>
           </a:xfrm>
+          <a:prstGeom prst="rect">
+            <a:avLst/>
+          </a:prstGeom>
         </p:spPr>
-      </p:pic>
-      <p:sp>
-        <p:nvSpPr>
-          <p:cNvPr id="12" name="TextBox 11">
+        <p:txBody>
+          <a:bodyPr vert="horz" lIns="0" tIns="45720" rIns="0" bIns="45720" rtlCol="0">
+            <a:normAutofit/>
+          </a:bodyPr>
+          <a:lstStyle>
+            <a:lvl1pPr marL="91440" indent="-91440" algn="l" defTabSz="914400" rtl="0" eaLnBrk="1" latinLnBrk="0" hangingPunct="1">
+              <a:lnSpc>
+                <a:spcPct val="90000"/>
+              </a:lnSpc>
+              <a:spcBef>
+                <a:spcPts val="1200"/>
+              </a:spcBef>
+              <a:spcAft>
+                <a:spcPts val="200"/>
+              </a:spcAft>
+              <a:buClr>
+                <a:schemeClr val="accent1"/>
+              </a:buClr>
+              <a:buSzPct val="100000"/>
+              <a:buFont typeface="Calibri" panose="020F0502020204030204" pitchFamily="34" charset="0"/>
+              <a:buChar char=" "/>
+              <a:defRPr sz="2000" kern="1200">
+                <a:solidFill>
+                  <a:schemeClr val="tx1">
+                    <a:lumMod val="75000"/>
+                    <a:lumOff val="25000"/>
+                  </a:schemeClr>
+                </a:solidFill>
+                <a:latin typeface="+mn-lt"/>
+                <a:ea typeface="+mn-ea"/>
+                <a:cs typeface="+mn-cs"/>
+              </a:defRPr>
+            </a:lvl1pPr>
+            <a:lvl2pPr marL="384048" indent="-182880" algn="l" defTabSz="914400" rtl="0" eaLnBrk="1" latinLnBrk="0" hangingPunct="1">
+              <a:lnSpc>
+                <a:spcPct val="90000"/>
+              </a:lnSpc>
+              <a:spcBef>
+                <a:spcPts val="200"/>
+              </a:spcBef>
+              <a:spcAft>
+                <a:spcPts val="400"/>
+              </a:spcAft>
+              <a:buClr>
+                <a:schemeClr val="accent1"/>
+              </a:buClr>
+              <a:buFont typeface="Calibri" pitchFamily="34" charset="0"/>
+              <a:buChar char="◦"/>
+              <a:defRPr sz="1800" kern="1200">
+                <a:solidFill>
+                  <a:schemeClr val="tx1">
+                    <a:lumMod val="75000"/>
+                    <a:lumOff val="25000"/>
+                  </a:schemeClr>
+                </a:solidFill>
+                <a:latin typeface="+mn-lt"/>
+                <a:ea typeface="+mn-ea"/>
+                <a:cs typeface="+mn-cs"/>
+              </a:defRPr>
+            </a:lvl2pPr>
+            <a:lvl3pPr marL="566928" indent="-182880" algn="l" defTabSz="914400" rtl="0" eaLnBrk="1" latinLnBrk="0" hangingPunct="1">
+              <a:lnSpc>
+                <a:spcPct val="90000"/>
+              </a:lnSpc>
+              <a:spcBef>
+                <a:spcPts val="200"/>
+              </a:spcBef>
+              <a:spcAft>
+                <a:spcPts val="400"/>
+              </a:spcAft>
+              <a:buClr>
+                <a:schemeClr val="accent1"/>
+              </a:buClr>
+              <a:buFont typeface="Calibri" pitchFamily="34" charset="0"/>
+              <a:buChar char="◦"/>
+              <a:defRPr sz="1400" kern="1200">
+                <a:solidFill>
+                  <a:schemeClr val="tx1">
+                    <a:lumMod val="75000"/>
+                    <a:lumOff val="25000"/>
+                  </a:schemeClr>
+                </a:solidFill>
+                <a:latin typeface="+mn-lt"/>
+                <a:ea typeface="+mn-ea"/>
+                <a:cs typeface="+mn-cs"/>
+              </a:defRPr>
+            </a:lvl3pPr>
+            <a:lvl4pPr marL="749808" indent="-182880" algn="l" defTabSz="914400" rtl="0" eaLnBrk="1" latinLnBrk="0" hangingPunct="1">
+              <a:lnSpc>
+                <a:spcPct val="90000"/>
+              </a:lnSpc>
+              <a:spcBef>
+                <a:spcPts val="200"/>
+              </a:spcBef>
+              <a:spcAft>
+                <a:spcPts val="400"/>
+              </a:spcAft>
+              <a:buClr>
+                <a:schemeClr val="accent1"/>
+              </a:buClr>
+              <a:buFont typeface="Calibri" pitchFamily="34" charset="0"/>
+              <a:buChar char="◦"/>
+              <a:defRPr sz="1400" kern="1200">
+                <a:solidFill>
+                  <a:schemeClr val="tx1">
+                    <a:lumMod val="75000"/>
+                    <a:lumOff val="25000"/>
+                  </a:schemeClr>
+                </a:solidFill>
+                <a:latin typeface="+mn-lt"/>
+                <a:ea typeface="+mn-ea"/>
+                <a:cs typeface="+mn-cs"/>
+              </a:defRPr>
+            </a:lvl4pPr>
+            <a:lvl5pPr marL="932688" indent="-182880" algn="l" defTabSz="914400" rtl="0" eaLnBrk="1" latinLnBrk="0" hangingPunct="1">
+              <a:lnSpc>
+                <a:spcPct val="90000"/>
+              </a:lnSpc>
+              <a:spcBef>
+                <a:spcPts val="200"/>
+              </a:spcBef>
+              <a:spcAft>
+                <a:spcPts val="400"/>
+              </a:spcAft>
+              <a:buClr>
+                <a:schemeClr val="accent1"/>
+              </a:buClr>
+              <a:buFont typeface="Calibri" pitchFamily="34" charset="0"/>
+              <a:buChar char="◦"/>
+              <a:defRPr sz="1400" kern="1200">
+                <a:solidFill>
+                  <a:schemeClr val="tx1">
+                    <a:lumMod val="75000"/>
+                    <a:lumOff val="25000"/>
+                  </a:schemeClr>
+                </a:solidFill>
+                <a:latin typeface="+mn-lt"/>
+                <a:ea typeface="+mn-ea"/>
+                <a:cs typeface="+mn-cs"/>
+              </a:defRPr>
+            </a:lvl5pPr>
+            <a:lvl6pPr marL="1100000" indent="-228600" algn="l" defTabSz="914400" rtl="0" eaLnBrk="1" latinLnBrk="0" hangingPunct="1">
+              <a:lnSpc>
+                <a:spcPct val="90000"/>
+              </a:lnSpc>
+              <a:spcBef>
+                <a:spcPts val="200"/>
+              </a:spcBef>
+              <a:spcAft>
+                <a:spcPts val="400"/>
+              </a:spcAft>
+              <a:buClr>
+                <a:schemeClr val="accent1"/>
+              </a:buClr>
+              <a:buFont typeface="Calibri" pitchFamily="34" charset="0"/>
+              <a:buChar char="◦"/>
+              <a:defRPr sz="1400" kern="1200">
+                <a:solidFill>
+                  <a:schemeClr val="tx1">
+                    <a:lumMod val="75000"/>
+                    <a:lumOff val="25000"/>
+                  </a:schemeClr>
+                </a:solidFill>
+                <a:latin typeface="+mn-lt"/>
+                <a:ea typeface="+mn-ea"/>
+                <a:cs typeface="+mn-cs"/>
+              </a:defRPr>
+            </a:lvl6pPr>
+            <a:lvl7pPr marL="1300000" indent="-228600" algn="l" defTabSz="914400" rtl="0" eaLnBrk="1" latinLnBrk="0" hangingPunct="1">
+              <a:lnSpc>
+                <a:spcPct val="90000"/>
+              </a:lnSpc>
+              <a:spcBef>
+                <a:spcPts val="200"/>
+              </a:spcBef>
+              <a:spcAft>
+                <a:spcPts val="400"/>
+              </a:spcAft>
+              <a:buClr>
+                <a:schemeClr val="accent1"/>
+              </a:buClr>
+              <a:buFont typeface="Calibri" pitchFamily="34" charset="0"/>
+              <a:buChar char="◦"/>
+              <a:defRPr sz="1400" kern="1200">
+                <a:solidFill>
+                  <a:schemeClr val="tx1">
+                    <a:lumMod val="75000"/>
+                    <a:lumOff val="25000"/>
+                  </a:schemeClr>
+                </a:solidFill>
+                <a:latin typeface="+mn-lt"/>
+                <a:ea typeface="+mn-ea"/>
+                <a:cs typeface="+mn-cs"/>
+              </a:defRPr>
+            </a:lvl7pPr>
+            <a:lvl8pPr marL="1500000" indent="-228600" algn="l" defTabSz="914400" rtl="0" eaLnBrk="1" latinLnBrk="0" hangingPunct="1">
+              <a:lnSpc>
+                <a:spcPct val="90000"/>
+              </a:lnSpc>
+              <a:spcBef>
+                <a:spcPts val="200"/>
+              </a:spcBef>
+              <a:spcAft>
+                <a:spcPts val="400"/>
+              </a:spcAft>
+              <a:buClr>
+                <a:schemeClr val="accent1"/>
+              </a:buClr>
+              <a:buFont typeface="Calibri" pitchFamily="34" charset="0"/>
+              <a:buChar char="◦"/>
+              <a:defRPr sz="1400" kern="1200">
+                <a:solidFill>
+                  <a:schemeClr val="tx1">
+                    <a:lumMod val="75000"/>
+                    <a:lumOff val="25000"/>
+                  </a:schemeClr>
+                </a:solidFill>
+                <a:latin typeface="+mn-lt"/>
+                <a:ea typeface="+mn-ea"/>
+                <a:cs typeface="+mn-cs"/>
+              </a:defRPr>
+            </a:lvl8pPr>
+            <a:lvl9pPr marL="1700000" indent="-228600" algn="l" defTabSz="914400" rtl="0" eaLnBrk="1" latinLnBrk="0" hangingPunct="1">
+              <a:lnSpc>
+                <a:spcPct val="90000"/>
+              </a:lnSpc>
+              <a:spcBef>
+                <a:spcPts val="200"/>
+              </a:spcBef>
+              <a:spcAft>
+                <a:spcPts val="400"/>
+              </a:spcAft>
+              <a:buClr>
+                <a:schemeClr val="accent1"/>
+              </a:buClr>
+              <a:buFont typeface="Calibri" pitchFamily="34" charset="0"/>
+              <a:buChar char="◦"/>
+              <a:defRPr sz="1400" kern="1200">
+                <a:solidFill>
+                  <a:schemeClr val="tx1">
+                    <a:lumMod val="75000"/>
+                    <a:lumOff val="25000"/>
+                  </a:schemeClr>
+                </a:solidFill>
+                <a:latin typeface="+mn-lt"/>
+                <a:ea typeface="+mn-ea"/>
+                <a:cs typeface="+mn-cs"/>
+              </a:defRPr>
+            </a:lvl9pPr>
+          </a:lstStyle>
+          <a:p>
+            <a:pPr marL="0" indent="0" algn="ctr">
+              <a:buFont typeface="Calibri" panose="020F0502020204030204" pitchFamily="34" charset="0"/>
+              <a:buNone/>
+            </a:pPr>
+            <a:r>
+              <a:rPr lang="pt-PT" sz="1600" u="sng" dirty="0"/>
+              <a:t>Dados de entrada</a:t>
+            </a:r>
+            <a:r>
+              <a:rPr lang="pt-PT" sz="1600" dirty="0"/>
+              <a:t>: </a:t>
+            </a:r>
+          </a:p>
+          <a:p>
+            <a:pPr>
+              <a:buFont typeface="Wingdings" panose="05000000000000000000" pitchFamily="2" charset="2"/>
+              <a:buChar char="Ø"/>
+            </a:pPr>
+            <a:r>
+              <a:rPr lang="pt-PT" sz="1600" dirty="0"/>
+              <a:t>Vetor&lt;Encomenda&gt; E- Conjunto de encomendas caracterizadas por:</a:t>
+            </a:r>
+          </a:p>
+          <a:p>
+            <a:pPr lvl="1">
+              <a:buFont typeface="Wingdings" panose="05000000000000000000" pitchFamily="2" charset="2"/>
+              <a:buChar char="Ø"/>
+            </a:pPr>
+            <a:r>
+              <a:rPr lang="pt-PT" sz="1400" dirty="0"/>
+              <a:t>Peso</a:t>
+            </a:r>
+          </a:p>
+          <a:p>
+            <a:pPr lvl="1">
+              <a:buFont typeface="Wingdings" panose="05000000000000000000" pitchFamily="2" charset="2"/>
+              <a:buChar char="Ø"/>
+            </a:pPr>
+            <a:r>
+              <a:rPr lang="pt-PT" sz="1400" dirty="0"/>
+              <a:t>Volume</a:t>
+            </a:r>
+          </a:p>
+          <a:p>
+            <a:pPr lvl="1">
+              <a:buFont typeface="Wingdings" panose="05000000000000000000" pitchFamily="2" charset="2"/>
+              <a:buChar char="Ø"/>
+            </a:pPr>
+            <a:r>
+              <a:rPr lang="pt-PT" sz="1400" dirty="0"/>
+              <a:t>Recompensa</a:t>
+            </a:r>
+          </a:p>
+          <a:p>
+            <a:pPr lvl="1">
+              <a:buFont typeface="Wingdings" panose="05000000000000000000" pitchFamily="2" charset="2"/>
+              <a:buChar char="Ø"/>
+            </a:pPr>
+            <a:r>
+              <a:rPr lang="pt-PT" sz="1400" dirty="0"/>
+              <a:t>Duração </a:t>
+            </a:r>
+          </a:p>
+          <a:p>
+            <a:pPr lvl="1">
+              <a:buFont typeface="Wingdings" panose="05000000000000000000" pitchFamily="2" charset="2"/>
+              <a:buChar char="Ø"/>
+            </a:pPr>
+            <a:endParaRPr lang="pt-PT" sz="1400" dirty="0"/>
+          </a:p>
+          <a:p>
+            <a:pPr>
+              <a:buFont typeface="Wingdings" panose="05000000000000000000" pitchFamily="2" charset="2"/>
+              <a:buChar char="Ø"/>
+            </a:pPr>
+            <a:r>
+              <a:rPr lang="pt-PT" sz="1600" dirty="0"/>
+              <a:t>Vetor&lt;Carrinha&gt; C –Conjunto de </a:t>
+            </a:r>
+            <a:r>
+              <a:rPr lang="pt-PT" sz="1600" dirty="0" err="1"/>
+              <a:t>carrias</a:t>
+            </a:r>
+            <a:r>
+              <a:rPr lang="pt-PT" sz="1600" dirty="0"/>
+              <a:t> caracterizadas por:</a:t>
+            </a:r>
+          </a:p>
+          <a:p>
+            <a:pPr lvl="1">
+              <a:buFont typeface="Wingdings" panose="05000000000000000000" pitchFamily="2" charset="2"/>
+              <a:buChar char="Ø"/>
+            </a:pPr>
+            <a:r>
+              <a:rPr lang="pt-PT" sz="1400" dirty="0" err="1"/>
+              <a:t>PesoMax</a:t>
+            </a:r>
+            <a:endParaRPr lang="pt-PT" sz="1400" dirty="0"/>
+          </a:p>
+          <a:p>
+            <a:pPr lvl="1">
+              <a:buFont typeface="Wingdings" panose="05000000000000000000" pitchFamily="2" charset="2"/>
+              <a:buChar char="Ø"/>
+            </a:pPr>
+            <a:r>
+              <a:rPr lang="pt-PT" sz="1400" dirty="0" err="1"/>
+              <a:t>VolMax</a:t>
+            </a:r>
+            <a:endParaRPr lang="pt-PT" sz="1400" dirty="0"/>
+          </a:p>
+          <a:p>
+            <a:pPr lvl="1">
+              <a:buFont typeface="Wingdings" panose="05000000000000000000" pitchFamily="2" charset="2"/>
+              <a:buChar char="Ø"/>
+            </a:pPr>
+            <a:r>
+              <a:rPr lang="pt-PT" sz="1400" dirty="0"/>
+              <a:t>Custo</a:t>
+            </a:r>
+          </a:p>
+          <a:p>
+            <a:pPr lvl="1">
+              <a:buFont typeface="Wingdings" panose="05000000000000000000" pitchFamily="2" charset="2"/>
+              <a:buChar char="Ø"/>
+            </a:pPr>
+            <a:r>
+              <a:rPr lang="pt-PT" sz="1400" dirty="0" err="1"/>
+              <a:t>PesoAtual</a:t>
+            </a:r>
+            <a:endParaRPr lang="pt-PT" sz="1400" dirty="0"/>
+          </a:p>
+          <a:p>
+            <a:pPr lvl="1">
+              <a:buFont typeface="Wingdings" panose="05000000000000000000" pitchFamily="2" charset="2"/>
+              <a:buChar char="Ø"/>
+            </a:pPr>
+            <a:r>
+              <a:rPr lang="pt-PT" sz="1400" dirty="0" err="1"/>
+              <a:t>VolAtual</a:t>
+            </a:r>
+            <a:r>
+              <a:rPr lang="pt-PT" dirty="0"/>
+              <a:t> </a:t>
+            </a:r>
+          </a:p>
+        </p:txBody>
+      </p:sp>
+      <p:sp>
+        <p:nvSpPr>
+          <p:cNvPr id="6" name="TextBox 5">
             <a:extLst>
               <a:ext uri="{FF2B5EF4-FFF2-40B4-BE49-F238E27FC236}">
-                <a16:creationId xmlns:a16="http://schemas.microsoft.com/office/drawing/2014/main" id="{2648110A-AB00-47F1-9CED-899E88DFD305}"/>
+                <a16:creationId xmlns:a16="http://schemas.microsoft.com/office/drawing/2014/main" id="{33A1A7FD-057F-42F8-9018-4CE31FB92D8D}"/>
               </a:ext>
             </a:extLst>
           </p:cNvPr>
@@ -4897,8 +5709,8 @@
         </p:nvSpPr>
         <p:spPr>
           <a:xfrm>
-            <a:off x="3045414" y="5120639"/>
-            <a:ext cx="6162131" cy="923330"/>
+            <a:off x="6440631" y="1737360"/>
+            <a:ext cx="5751369" cy="2600712"/>
           </a:xfrm>
           <a:prstGeom prst="rect">
             <a:avLst/>
@@ -4911,25 +5723,425 @@
           </a:bodyPr>
           <a:lstStyle/>
           <a:p>
-            <a:pPr algn="ctr"/>
-            <a:r>
-              <a:rPr lang="pt-PT" dirty="0"/>
-              <a:t>Baseando no algoritmo de bin-packing: first fit. (decreasing)</a:t>
-            </a:r>
-          </a:p>
-          <a:p>
-            <a:pPr algn="ctr"/>
-            <a:r>
-              <a:rPr lang="pt-PT" dirty="0"/>
-              <a:t>Percorremos todos os camiões, vemos no metodo FitsInTruck se a encomenda é válida. </a:t>
-            </a:r>
+            <a:pPr marL="0" indent="0" algn="ctr">
+              <a:buNone/>
+            </a:pPr>
+            <a:r>
+              <a:rPr lang="pt-PT" sz="2000" u="sng" dirty="0">
+                <a:solidFill>
+                  <a:srgbClr val="000000">
+                    <a:lumMod val="75000"/>
+                    <a:lumOff val="25000"/>
+                  </a:srgbClr>
+                </a:solidFill>
+                <a:latin typeface="Calibri" panose="020F0502020204030204"/>
+              </a:rPr>
+              <a:t>D</a:t>
+            </a:r>
+            <a:r>
+              <a:rPr kumimoji="0" lang="pt-PT" sz="2000" b="0" i="0" u="sng" strike="noStrike" kern="1200" cap="none" spc="0" normalizeH="0" baseline="0" noProof="0" dirty="0">
+                <a:ln>
+                  <a:noFill/>
+                </a:ln>
+                <a:solidFill>
+                  <a:srgbClr val="000000">
+                    <a:lumMod val="75000"/>
+                    <a:lumOff val="25000"/>
+                  </a:srgbClr>
+                </a:solidFill>
+                <a:effectLst/>
+                <a:uLnTx/>
+                <a:uFillTx/>
+                <a:latin typeface="Calibri" panose="020F0502020204030204"/>
+                <a:ea typeface="+mn-ea"/>
+                <a:cs typeface="+mn-cs"/>
+              </a:rPr>
+              <a:t>ados de saída</a:t>
+            </a:r>
+          </a:p>
+          <a:p>
+            <a:pPr marL="91440" marR="0" lvl="0" indent="-91440" defTabSz="914400" rtl="0" eaLnBrk="1" fontAlgn="auto" latinLnBrk="0" hangingPunct="1">
+              <a:lnSpc>
+                <a:spcPct val="90000"/>
+              </a:lnSpc>
+              <a:spcBef>
+                <a:spcPts val="1200"/>
+              </a:spcBef>
+              <a:spcAft>
+                <a:spcPts val="200"/>
+              </a:spcAft>
+              <a:buClr>
+                <a:srgbClr val="E48312"/>
+              </a:buClr>
+              <a:buSzPct val="100000"/>
+              <a:buFont typeface="Wingdings" panose="05000000000000000000" pitchFamily="2" charset="2"/>
+              <a:buChar char="Ø"/>
+              <a:tabLst/>
+              <a:defRPr/>
+            </a:pPr>
+            <a:r>
+              <a:rPr kumimoji="0" lang="pt-PT" sz="2000" b="0" i="0" u="none" strike="noStrike" kern="1200" cap="none" spc="0" normalizeH="0" baseline="0" noProof="0" dirty="0">
+                <a:ln>
+                  <a:noFill/>
+                </a:ln>
+                <a:solidFill>
+                  <a:srgbClr val="000000">
+                    <a:lumMod val="75000"/>
+                    <a:lumOff val="25000"/>
+                  </a:srgbClr>
+                </a:solidFill>
+                <a:effectLst/>
+                <a:uLnTx/>
+                <a:uFillTx/>
+                <a:latin typeface="Calibri" panose="020F0502020204030204"/>
+                <a:ea typeface="+mn-ea"/>
+                <a:cs typeface="+mn-cs"/>
+              </a:rPr>
+              <a:t>2 </a:t>
+            </a:r>
+            <a:r>
+              <a:rPr lang="pt-PT" sz="2000" dirty="0">
+                <a:solidFill>
+                  <a:srgbClr val="000000">
+                    <a:lumMod val="75000"/>
+                    <a:lumOff val="25000"/>
+                  </a:srgbClr>
+                </a:solidFill>
+                <a:latin typeface="Calibri" panose="020F0502020204030204"/>
+              </a:rPr>
+              <a:t>Vetores&lt;</a:t>
+            </a:r>
+            <a:r>
+              <a:rPr lang="pt-PT" sz="2000" dirty="0" err="1">
+                <a:solidFill>
+                  <a:srgbClr val="000000">
+                    <a:lumMod val="75000"/>
+                    <a:lumOff val="25000"/>
+                  </a:srgbClr>
+                </a:solidFill>
+                <a:latin typeface="Calibri" panose="020F0502020204030204"/>
+              </a:rPr>
+              <a:t>EstafetaouPedido</a:t>
+            </a:r>
+            <a:r>
+              <a:rPr lang="pt-PT" sz="2000" dirty="0">
+                <a:solidFill>
+                  <a:srgbClr val="000000">
+                    <a:lumMod val="75000"/>
+                    <a:lumOff val="25000"/>
+                  </a:srgbClr>
+                </a:solidFill>
+                <a:latin typeface="Calibri" panose="020F0502020204030204"/>
+              </a:rPr>
+              <a:t>&gt;</a:t>
+            </a:r>
+            <a:r>
+              <a:rPr kumimoji="0" lang="pt-PT" sz="2000" b="0" i="0" u="none" strike="noStrike" kern="1200" cap="none" spc="0" normalizeH="0" baseline="0" noProof="0" dirty="0">
+                <a:ln>
+                  <a:noFill/>
+                </a:ln>
+                <a:solidFill>
+                  <a:srgbClr val="000000">
+                    <a:lumMod val="75000"/>
+                    <a:lumOff val="25000"/>
+                  </a:srgbClr>
+                </a:solidFill>
+                <a:effectLst/>
+                <a:uLnTx/>
+                <a:uFillTx/>
+                <a:latin typeface="Calibri" panose="020F0502020204030204"/>
+                <a:ea typeface="+mn-ea"/>
+                <a:cs typeface="+mn-cs"/>
+              </a:rPr>
+              <a:t>, </a:t>
+            </a:r>
+            <a:r>
+              <a:rPr kumimoji="0" lang="pt-PT" sz="2000" b="0" i="0" u="none" strike="noStrike" kern="1200" cap="none" spc="0" normalizeH="0" baseline="0" noProof="0" dirty="0" err="1">
+                <a:ln>
+                  <a:noFill/>
+                </a:ln>
+                <a:solidFill>
+                  <a:srgbClr val="000000">
+                    <a:lumMod val="75000"/>
+                    <a:lumOff val="25000"/>
+                  </a:srgbClr>
+                </a:solidFill>
+                <a:effectLst/>
+                <a:uLnTx/>
+                <a:uFillTx/>
+                <a:latin typeface="Calibri" panose="020F0502020204030204"/>
+                <a:ea typeface="+mn-ea"/>
+                <a:cs typeface="+mn-cs"/>
+              </a:rPr>
+              <a:t>Est</a:t>
+            </a:r>
+            <a:r>
+              <a:rPr kumimoji="0" lang="pt-PT" sz="2000" b="0" i="0" u="none" strike="noStrike" kern="1200" cap="none" spc="0" normalizeH="0" baseline="0" noProof="0" dirty="0">
+                <a:ln>
+                  <a:noFill/>
+                </a:ln>
+                <a:solidFill>
+                  <a:srgbClr val="000000">
+                    <a:lumMod val="75000"/>
+                    <a:lumOff val="25000"/>
+                  </a:srgbClr>
+                </a:solidFill>
+                <a:effectLst/>
+                <a:uLnTx/>
+                <a:uFillTx/>
+                <a:latin typeface="Calibri" panose="020F0502020204030204"/>
+                <a:ea typeface="+mn-ea"/>
+                <a:cs typeface="+mn-cs"/>
+              </a:rPr>
+              <a:t> e </a:t>
+            </a:r>
+            <a:r>
+              <a:rPr kumimoji="0" lang="pt-PT" sz="2000" b="0" i="0" u="none" strike="noStrike" kern="1200" cap="none" spc="0" normalizeH="0" baseline="0" noProof="0" dirty="0" err="1">
+                <a:ln>
+                  <a:noFill/>
+                </a:ln>
+                <a:solidFill>
+                  <a:srgbClr val="000000">
+                    <a:lumMod val="75000"/>
+                    <a:lumOff val="25000"/>
+                  </a:srgbClr>
+                </a:solidFill>
+                <a:effectLst/>
+                <a:uLnTx/>
+                <a:uFillTx/>
+                <a:latin typeface="Calibri" panose="020F0502020204030204"/>
+                <a:ea typeface="+mn-ea"/>
+                <a:cs typeface="+mn-cs"/>
+              </a:rPr>
+              <a:t>Ped</a:t>
+            </a:r>
+            <a:r>
+              <a:rPr lang="pt-PT" sz="2000" dirty="0">
+                <a:solidFill>
+                  <a:srgbClr val="000000">
+                    <a:lumMod val="75000"/>
+                    <a:lumOff val="25000"/>
+                  </a:srgbClr>
+                </a:solidFill>
+                <a:latin typeface="Calibri" panose="020F0502020204030204"/>
+              </a:rPr>
+              <a:t>-Conjunto de carrinhas registadas e pedidos a entregar caracterizados por:</a:t>
+            </a:r>
+          </a:p>
+          <a:p>
+            <a:pPr marL="548640" lvl="1" indent="-91440" defTabSz="914400">
+              <a:lnSpc>
+                <a:spcPct val="90000"/>
+              </a:lnSpc>
+              <a:spcBef>
+                <a:spcPts val="1200"/>
+              </a:spcBef>
+              <a:spcAft>
+                <a:spcPts val="200"/>
+              </a:spcAft>
+              <a:buClr>
+                <a:srgbClr val="E48312"/>
+              </a:buClr>
+              <a:buSzPct val="100000"/>
+              <a:buFont typeface="Wingdings" panose="05000000000000000000" pitchFamily="2" charset="2"/>
+              <a:buChar char="Ø"/>
+              <a:defRPr/>
+            </a:pPr>
+            <a:r>
+              <a:rPr kumimoji="0" lang="pt-PT" sz="2000" b="0" i="0" u="none" strike="noStrike" kern="1200" cap="none" spc="0" normalizeH="0" baseline="0" noProof="0" dirty="0">
+                <a:ln>
+                  <a:noFill/>
+                </a:ln>
+                <a:solidFill>
+                  <a:srgbClr val="000000">
+                    <a:lumMod val="75000"/>
+                    <a:lumOff val="25000"/>
+                  </a:srgbClr>
+                </a:solidFill>
+                <a:effectLst/>
+                <a:uLnTx/>
+                <a:uFillTx/>
+                <a:latin typeface="Calibri" panose="020F0502020204030204"/>
+                <a:ea typeface="+mn-ea"/>
+                <a:cs typeface="+mn-cs"/>
+              </a:rPr>
+              <a:t>Peso</a:t>
+            </a:r>
+          </a:p>
+          <a:p>
+            <a:pPr marL="548640" lvl="1" indent="-91440" defTabSz="914400">
+              <a:lnSpc>
+                <a:spcPct val="90000"/>
+              </a:lnSpc>
+              <a:spcBef>
+                <a:spcPts val="1200"/>
+              </a:spcBef>
+              <a:spcAft>
+                <a:spcPts val="200"/>
+              </a:spcAft>
+              <a:buClr>
+                <a:srgbClr val="E48312"/>
+              </a:buClr>
+              <a:buSzPct val="100000"/>
+              <a:buFont typeface="Wingdings" panose="05000000000000000000" pitchFamily="2" charset="2"/>
+              <a:buChar char="Ø"/>
+              <a:defRPr/>
+            </a:pPr>
+            <a:r>
+              <a:rPr lang="pt-PT" sz="2000" dirty="0">
+                <a:solidFill>
+                  <a:srgbClr val="000000">
+                    <a:lumMod val="75000"/>
+                    <a:lumOff val="25000"/>
+                  </a:srgbClr>
+                </a:solidFill>
+                <a:latin typeface="Calibri" panose="020F0502020204030204"/>
+              </a:rPr>
+              <a:t>Volume</a:t>
+            </a:r>
+            <a:endParaRPr kumimoji="0" lang="pt-PT" sz="2000" b="0" i="0" u="none" strike="noStrike" kern="1200" cap="none" spc="0" normalizeH="0" baseline="0" noProof="0" dirty="0">
+              <a:ln>
+                <a:noFill/>
+              </a:ln>
+              <a:solidFill>
+                <a:srgbClr val="000000">
+                  <a:lumMod val="75000"/>
+                  <a:lumOff val="25000"/>
+                </a:srgbClr>
+              </a:solidFill>
+              <a:effectLst/>
+              <a:uLnTx/>
+              <a:uFillTx/>
+              <a:latin typeface="Calibri" panose="020F0502020204030204"/>
+              <a:ea typeface="+mn-ea"/>
+              <a:cs typeface="+mn-cs"/>
+            </a:endParaRPr>
+          </a:p>
+          <a:p>
+            <a:endParaRPr lang="pt-PT" dirty="0"/>
+          </a:p>
+        </p:txBody>
+      </p:sp>
+      <p:sp>
+        <p:nvSpPr>
+          <p:cNvPr id="7" name="TextBox 6">
+            <a:extLst>
+              <a:ext uri="{FF2B5EF4-FFF2-40B4-BE49-F238E27FC236}">
+                <a16:creationId xmlns:a16="http://schemas.microsoft.com/office/drawing/2014/main" id="{0FC99067-2FE4-49FA-A359-140ACF56302F}"/>
+              </a:ext>
+            </a:extLst>
+          </p:cNvPr>
+          <p:cNvSpPr txBox="1"/>
+          <p:nvPr/>
+        </p:nvSpPr>
+        <p:spPr>
+          <a:xfrm>
+            <a:off x="6305513" y="4574939"/>
+            <a:ext cx="5751369" cy="1410643"/>
+          </a:xfrm>
+          <a:prstGeom prst="rect">
+            <a:avLst/>
+          </a:prstGeom>
+          <a:noFill/>
+        </p:spPr>
+        <p:txBody>
+          <a:bodyPr wrap="square" rtlCol="0">
+            <a:spAutoFit/>
+          </a:bodyPr>
+          <a:lstStyle/>
+          <a:p>
+            <a:pPr marL="0" indent="0" algn="ctr">
+              <a:buNone/>
+            </a:pPr>
+            <a:r>
+              <a:rPr lang="pt-PT" sz="2000" u="sng" dirty="0">
+                <a:solidFill>
+                  <a:srgbClr val="000000">
+                    <a:lumMod val="75000"/>
+                    <a:lumOff val="25000"/>
+                  </a:srgbClr>
+                </a:solidFill>
+                <a:latin typeface="Calibri" panose="020F0502020204030204"/>
+              </a:rPr>
+              <a:t>Restrições e Domínios de valores</a:t>
+            </a:r>
+            <a:endParaRPr kumimoji="0" lang="pt-PT" sz="2000" b="0" i="0" u="sng" strike="noStrike" kern="1200" cap="none" spc="0" normalizeH="0" baseline="0" noProof="0" dirty="0">
+              <a:ln>
+                <a:noFill/>
+              </a:ln>
+              <a:solidFill>
+                <a:srgbClr val="000000">
+                  <a:lumMod val="75000"/>
+                  <a:lumOff val="25000"/>
+                </a:srgbClr>
+              </a:solidFill>
+              <a:effectLst/>
+              <a:uLnTx/>
+              <a:uFillTx/>
+              <a:latin typeface="Calibri" panose="020F0502020204030204"/>
+              <a:ea typeface="+mn-ea"/>
+              <a:cs typeface="+mn-cs"/>
+            </a:endParaRPr>
+          </a:p>
+          <a:p>
+            <a:pPr marL="91440" marR="0" lvl="0" indent="-91440" defTabSz="914400" rtl="0" eaLnBrk="1" fontAlgn="auto" latinLnBrk="0" hangingPunct="1">
+              <a:lnSpc>
+                <a:spcPct val="90000"/>
+              </a:lnSpc>
+              <a:spcBef>
+                <a:spcPts val="1200"/>
+              </a:spcBef>
+              <a:spcAft>
+                <a:spcPts val="200"/>
+              </a:spcAft>
+              <a:buClr>
+                <a:srgbClr val="E48312"/>
+              </a:buClr>
+              <a:buSzPct val="100000"/>
+              <a:buFont typeface="Wingdings" panose="05000000000000000000" pitchFamily="2" charset="2"/>
+              <a:buChar char="Ø"/>
+              <a:tabLst/>
+              <a:defRPr/>
+            </a:pPr>
+            <a:r>
+              <a:rPr lang="pt-PT" sz="2000" dirty="0">
+                <a:solidFill>
+                  <a:srgbClr val="000000">
+                    <a:lumMod val="75000"/>
+                    <a:lumOff val="25000"/>
+                  </a:srgbClr>
+                </a:solidFill>
+                <a:latin typeface="Calibri" panose="020F0502020204030204"/>
+              </a:rPr>
+              <a:t> Todos os valores têm de ser positivos e pertencentes a N</a:t>
+            </a:r>
+            <a:endParaRPr kumimoji="0" lang="pt-PT" sz="2000" b="0" i="0" u="none" strike="noStrike" kern="1200" cap="none" spc="0" normalizeH="0" baseline="0" noProof="0" dirty="0">
+              <a:ln>
+                <a:noFill/>
+              </a:ln>
+              <a:solidFill>
+                <a:srgbClr val="000000">
+                  <a:lumMod val="75000"/>
+                  <a:lumOff val="25000"/>
+                </a:srgbClr>
+              </a:solidFill>
+              <a:effectLst/>
+              <a:uLnTx/>
+              <a:uFillTx/>
+              <a:latin typeface="Calibri" panose="020F0502020204030204"/>
+              <a:ea typeface="+mn-ea"/>
+              <a:cs typeface="+mn-cs"/>
+            </a:endParaRPr>
+          </a:p>
+          <a:p>
+            <a:endParaRPr lang="pt-PT" dirty="0"/>
           </a:p>
         </p:txBody>
       </p:sp>
     </p:spTree>
     <p:extLst>
       <p:ext uri="{BB962C8B-B14F-4D97-AF65-F5344CB8AC3E}">
-        <p14:creationId xmlns:p14="http://schemas.microsoft.com/office/powerpoint/2010/main" val="3935639374"/>
+        <p14:creationId xmlns:p14="http://schemas.microsoft.com/office/powerpoint/2010/main" val="1507378260"/>
       </p:ext>
     </p:extLst>
   </p:cSld>
@@ -4994,39 +6206,88 @@
           </a:p>
         </p:txBody>
       </p:sp>
-      <p:sp>
-        <p:nvSpPr>
-          <p:cNvPr id="3" name="Content Placeholder 2">
+      <p:pic>
+        <p:nvPicPr>
+          <p:cNvPr id="9" name="Content Placeholder 8" descr="Text, letter&#10;&#10;Description automatically generated">
             <a:extLst>
               <a:ext uri="{FF2B5EF4-FFF2-40B4-BE49-F238E27FC236}">
-                <a16:creationId xmlns:a16="http://schemas.microsoft.com/office/drawing/2014/main" id="{0DA53B97-5997-490C-B21F-AEAD1D079AC5}"/>
+                <a16:creationId xmlns:a16="http://schemas.microsoft.com/office/drawing/2014/main" id="{3F81FF3F-F559-47D5-8A02-21FFA47069F2}"/>
               </a:ext>
             </a:extLst>
           </p:cNvPr>
-          <p:cNvSpPr>
-            <a:spLocks noGrp="1"/>
-          </p:cNvSpPr>
+          <p:cNvPicPr>
+            <a:picLocks noGrp="1" noChangeAspect="1"/>
+          </p:cNvPicPr>
           <p:nvPr>
             <p:ph idx="1"/>
           </p:nvPr>
-        </p:nvSpPr>
-        <p:spPr/>
-        <p:txBody>
-          <a:bodyPr/>
+        </p:nvPicPr>
+        <p:blipFill>
+          <a:blip r:embed="rId2">
+            <a:extLst>
+              <a:ext uri="{28A0092B-C50C-407E-A947-70E740481C1C}">
+                <a14:useLocalDpi xmlns:a14="http://schemas.microsoft.com/office/drawing/2010/main" val="0"/>
+              </a:ext>
+            </a:extLst>
+          </a:blip>
+          <a:stretch>
+            <a:fillRect/>
+          </a:stretch>
+        </p:blipFill>
+        <p:spPr>
+          <a:xfrm>
+            <a:off x="4147865" y="1961945"/>
+            <a:ext cx="3896269" cy="2934109"/>
+          </a:xfrm>
+        </p:spPr>
+      </p:pic>
+      <p:sp>
+        <p:nvSpPr>
+          <p:cNvPr id="12" name="TextBox 11">
+            <a:extLst>
+              <a:ext uri="{FF2B5EF4-FFF2-40B4-BE49-F238E27FC236}">
+                <a16:creationId xmlns:a16="http://schemas.microsoft.com/office/drawing/2014/main" id="{2648110A-AB00-47F1-9CED-899E88DFD305}"/>
+              </a:ext>
+            </a:extLst>
+          </p:cNvPr>
+          <p:cNvSpPr txBox="1"/>
+          <p:nvPr/>
+        </p:nvSpPr>
+        <p:spPr>
+          <a:xfrm>
+            <a:off x="3045414" y="5120639"/>
+            <a:ext cx="6162131" cy="923330"/>
+          </a:xfrm>
+          <a:prstGeom prst="rect">
+            <a:avLst/>
+          </a:prstGeom>
+          <a:noFill/>
+        </p:spPr>
+        <p:txBody>
+          <a:bodyPr wrap="square" rtlCol="0">
+            <a:spAutoFit/>
+          </a:bodyPr>
           <a:lstStyle/>
           <a:p>
-            <a:r>
-              <a:rPr lang="en-US" dirty="0"/>
-              <a:t>Greedy Algorithm</a:t>
-            </a:r>
-            <a:endParaRPr lang="pt-PT" dirty="0"/>
+            <a:pPr algn="ctr"/>
+            <a:r>
+              <a:rPr lang="pt-PT" dirty="0"/>
+              <a:t>Baseando no algoritmo de bin-packing: first fit. (decreasing)</a:t>
+            </a:r>
+          </a:p>
+          <a:p>
+            <a:pPr algn="ctr"/>
+            <a:r>
+              <a:rPr lang="pt-PT" dirty="0"/>
+              <a:t>Percorremos todos os camiões, vemos no metodo FitsInTruck se a encomenda é válida. </a:t>
+            </a:r>
           </a:p>
         </p:txBody>
       </p:sp>
     </p:spTree>
     <p:extLst>
       <p:ext uri="{BB962C8B-B14F-4D97-AF65-F5344CB8AC3E}">
-        <p14:creationId xmlns:p14="http://schemas.microsoft.com/office/powerpoint/2010/main" val="1758428583"/>
+        <p14:creationId xmlns:p14="http://schemas.microsoft.com/office/powerpoint/2010/main" val="3935639374"/>
       </p:ext>
     </p:extLst>
   </p:cSld>
@@ -5058,7 +6319,7 @@
           <p:cNvPr id="2" name="Title 1">
             <a:extLst>
               <a:ext uri="{FF2B5EF4-FFF2-40B4-BE49-F238E27FC236}">
-                <a16:creationId xmlns:a16="http://schemas.microsoft.com/office/drawing/2014/main" id="{985620E8-013C-4AB0-BBA5-EF61AB90C269}"/>
+                <a16:creationId xmlns:a16="http://schemas.microsoft.com/office/drawing/2014/main" id="{905083D3-96D5-454B-A94C-2CB33399B9A1}"/>
               </a:ext>
             </a:extLst>
           </p:cNvPr>
@@ -5087,39 +6348,180 @@
               <a:rPr lang="en-US" b="1" dirty="0" err="1"/>
               <a:t>Solução</a:t>
             </a:r>
-            <a:endParaRPr lang="pt-PT" b="1" dirty="0"/>
-          </a:p>
-        </p:txBody>
-      </p:sp>
-      <p:sp>
-        <p:nvSpPr>
-          <p:cNvPr id="3" name="Content Placeholder 2">
+            <a:endParaRPr lang="pt-PT" dirty="0"/>
+          </a:p>
+        </p:txBody>
+      </p:sp>
+      <p:pic>
+        <p:nvPicPr>
+          <p:cNvPr id="4" name="Content Placeholder 8" descr="Text, letter&#10;&#10;Description automatically generated">
             <a:extLst>
               <a:ext uri="{FF2B5EF4-FFF2-40B4-BE49-F238E27FC236}">
-                <a16:creationId xmlns:a16="http://schemas.microsoft.com/office/drawing/2014/main" id="{0DA53B97-5997-490C-B21F-AEAD1D079AC5}"/>
+                <a16:creationId xmlns:a16="http://schemas.microsoft.com/office/drawing/2014/main" id="{61398ADD-0833-45E1-BAC1-4EE31EB7D8D4}"/>
               </a:ext>
             </a:extLst>
           </p:cNvPr>
-          <p:cNvSpPr>
-            <a:spLocks noGrp="1"/>
-          </p:cNvSpPr>
-          <p:nvPr>
-            <p:ph idx="1"/>
-          </p:nvPr>
-        </p:nvSpPr>
-        <p:spPr/>
-        <p:txBody>
-          <a:bodyPr/>
+          <p:cNvPicPr>
+            <a:picLocks noChangeAspect="1"/>
+          </p:cNvPicPr>
+          <p:nvPr/>
+        </p:nvPicPr>
+        <p:blipFill>
+          <a:blip r:embed="rId2">
+            <a:extLst>
+              <a:ext uri="{28A0092B-C50C-407E-A947-70E740481C1C}">
+                <a14:useLocalDpi xmlns:a14="http://schemas.microsoft.com/office/drawing/2010/main" val="0"/>
+              </a:ext>
+            </a:extLst>
+          </a:blip>
+          <a:stretch>
+            <a:fillRect/>
+          </a:stretch>
+        </p:blipFill>
+        <p:spPr>
+          <a:xfrm>
+            <a:off x="7259411" y="1961945"/>
+            <a:ext cx="3896269" cy="2934109"/>
+          </a:xfrm>
+          <a:prstGeom prst="rect">
+            <a:avLst/>
+          </a:prstGeom>
+        </p:spPr>
+      </p:pic>
+      <p:sp>
+        <p:nvSpPr>
+          <p:cNvPr id="5" name="TextBox 4">
+            <a:extLst>
+              <a:ext uri="{FF2B5EF4-FFF2-40B4-BE49-F238E27FC236}">
+                <a16:creationId xmlns:a16="http://schemas.microsoft.com/office/drawing/2014/main" id="{E0A9D527-AC5E-4F74-BD13-9F33FB55B4CD}"/>
+              </a:ext>
+            </a:extLst>
+          </p:cNvPr>
+          <p:cNvSpPr txBox="1"/>
+          <p:nvPr/>
+        </p:nvSpPr>
+        <p:spPr>
+          <a:xfrm>
+            <a:off x="725235" y="2551836"/>
+            <a:ext cx="6162131" cy="1754326"/>
+          </a:xfrm>
+          <a:prstGeom prst="rect">
+            <a:avLst/>
+          </a:prstGeom>
+          <a:noFill/>
+        </p:spPr>
+        <p:txBody>
+          <a:bodyPr wrap="square" rtlCol="0">
+            <a:spAutoFit/>
+          </a:bodyPr>
           <a:lstStyle/>
           <a:p>
-            <a:endParaRPr lang="pt-PT" dirty="0"/>
+            <a:pPr algn="ctr"/>
+            <a:r>
+              <a:rPr lang="pt-PT" dirty="0"/>
+              <a:t>Baseado no algoritmo de bin-</a:t>
+            </a:r>
+            <a:r>
+              <a:rPr lang="pt-PT" dirty="0" err="1"/>
+              <a:t>packing</a:t>
+            </a:r>
+            <a:r>
+              <a:rPr lang="pt-PT" dirty="0"/>
+              <a:t>: </a:t>
+            </a:r>
+            <a:r>
+              <a:rPr lang="pt-PT" dirty="0" err="1"/>
+              <a:t>first</a:t>
+            </a:r>
+            <a:r>
+              <a:rPr lang="pt-PT" dirty="0"/>
+              <a:t> </a:t>
+            </a:r>
+            <a:r>
+              <a:rPr lang="pt-PT" dirty="0" err="1"/>
+              <a:t>fit</a:t>
+            </a:r>
+            <a:r>
+              <a:rPr lang="pt-PT" dirty="0"/>
+              <a:t> (</a:t>
+            </a:r>
+            <a:r>
+              <a:rPr lang="pt-PT" dirty="0" err="1"/>
+              <a:t>decreasing</a:t>
+            </a:r>
+            <a:r>
+              <a:rPr lang="pt-PT" dirty="0"/>
+              <a:t>).</a:t>
+            </a:r>
+          </a:p>
+          <a:p>
+            <a:pPr algn="ctr"/>
+            <a:r>
+              <a:rPr lang="pt-PT" dirty="0"/>
+              <a:t>Após a ordenação das carrinhas e encomendas por ordem decrescente de capacidade (</a:t>
+            </a:r>
+            <a:r>
+              <a:rPr lang="pt-PT" dirty="0" err="1"/>
+              <a:t>peso+volume</a:t>
+            </a:r>
+            <a:r>
+              <a:rPr lang="pt-PT" dirty="0"/>
+              <a:t>),percorremos todos os camiões um a um e inserimos as encomendas que cabem no camião atual.</a:t>
+            </a:r>
+          </a:p>
+          <a:p>
+            <a:pPr algn="ctr"/>
+            <a:r>
+              <a:rPr lang="pt-PT" dirty="0"/>
+              <a:t> </a:t>
+            </a:r>
+          </a:p>
+        </p:txBody>
+      </p:sp>
+      <p:sp>
+        <p:nvSpPr>
+          <p:cNvPr id="6" name="TextBox 5">
+            <a:extLst>
+              <a:ext uri="{FF2B5EF4-FFF2-40B4-BE49-F238E27FC236}">
+                <a16:creationId xmlns:a16="http://schemas.microsoft.com/office/drawing/2014/main" id="{F18A2A3C-591B-40E0-A021-E0F506517821}"/>
+              </a:ext>
+            </a:extLst>
+          </p:cNvPr>
+          <p:cNvSpPr txBox="1"/>
+          <p:nvPr/>
+        </p:nvSpPr>
+        <p:spPr>
+          <a:xfrm>
+            <a:off x="5817281" y="4909023"/>
+            <a:ext cx="6162131" cy="369332"/>
+          </a:xfrm>
+          <a:prstGeom prst="rect">
+            <a:avLst/>
+          </a:prstGeom>
+          <a:noFill/>
+        </p:spPr>
+        <p:txBody>
+          <a:bodyPr wrap="square" rtlCol="0">
+            <a:spAutoFit/>
+          </a:bodyPr>
+          <a:lstStyle/>
+          <a:p>
+            <a:pPr algn="ctr"/>
+            <a:r>
+              <a:rPr lang="pt-PT" dirty="0" err="1"/>
+              <a:t>Pseudo</a:t>
+            </a:r>
+            <a:r>
+              <a:rPr lang="pt-PT" dirty="0"/>
+              <a:t> código da função aplicada</a:t>
+            </a:r>
           </a:p>
         </p:txBody>
       </p:sp>
     </p:spTree>
     <p:extLst>
       <p:ext uri="{BB962C8B-B14F-4D97-AF65-F5344CB8AC3E}">
-        <p14:creationId xmlns:p14="http://schemas.microsoft.com/office/powerpoint/2010/main" val="470523517"/>
+        <p14:creationId xmlns:p14="http://schemas.microsoft.com/office/powerpoint/2010/main" val="2615784666"/>
       </p:ext>
     </p:extLst>
   </p:cSld>
@@ -5151,7 +6553,7 @@
           <p:cNvPr id="2" name="Title 1">
             <a:extLst>
               <a:ext uri="{FF2B5EF4-FFF2-40B4-BE49-F238E27FC236}">
-                <a16:creationId xmlns:a16="http://schemas.microsoft.com/office/drawing/2014/main" id="{0D827E17-24D3-4ECC-8AD6-8C29A5AF86BF}"/>
+                <a16:creationId xmlns:a16="http://schemas.microsoft.com/office/drawing/2014/main" id="{985620E8-013C-4AB0-BBA5-EF61AB90C269}"/>
               </a:ext>
             </a:extLst>
           </p:cNvPr>
@@ -5167,7 +6569,20 @@
           <a:bodyPr/>
           <a:lstStyle/>
           <a:p>
-            <a:endParaRPr lang="pt-PT"/>
+            <a:pPr algn="ctr"/>
+            <a:r>
+              <a:rPr lang="en-US" b="1" dirty="0" err="1"/>
+              <a:t>Descrição</a:t>
+            </a:r>
+            <a:r>
+              <a:rPr lang="en-US" b="1" dirty="0"/>
+              <a:t> da </a:t>
+            </a:r>
+            <a:r>
+              <a:rPr lang="en-US" b="1" dirty="0" err="1"/>
+              <a:t>Solução</a:t>
+            </a:r>
+            <a:endParaRPr lang="pt-PT" b="1" dirty="0"/>
           </a:p>
         </p:txBody>
       </p:sp>
@@ -5176,7 +6591,7 @@
           <p:cNvPr id="3" name="Content Placeholder 2">
             <a:extLst>
               <a:ext uri="{FF2B5EF4-FFF2-40B4-BE49-F238E27FC236}">
-                <a16:creationId xmlns:a16="http://schemas.microsoft.com/office/drawing/2014/main" id="{ECA0915C-EE2D-4EB4-BF3A-96FCE8158E53}"/>
+                <a16:creationId xmlns:a16="http://schemas.microsoft.com/office/drawing/2014/main" id="{0DA53B97-5997-490C-B21F-AEAD1D079AC5}"/>
               </a:ext>
             </a:extLst>
           </p:cNvPr>
@@ -5192,14 +6607,18 @@
           <a:bodyPr/>
           <a:lstStyle/>
           <a:p>
-            <a:endParaRPr lang="pt-PT"/>
+            <a:r>
+              <a:rPr lang="en-US" dirty="0"/>
+              <a:t>Greedy Algorithm</a:t>
+            </a:r>
+            <a:endParaRPr lang="pt-PT" dirty="0"/>
           </a:p>
         </p:txBody>
       </p:sp>
     </p:spTree>
     <p:extLst>
       <p:ext uri="{BB962C8B-B14F-4D97-AF65-F5344CB8AC3E}">
-        <p14:creationId xmlns:p14="http://schemas.microsoft.com/office/powerpoint/2010/main" val="2126801611"/>
+        <p14:creationId xmlns:p14="http://schemas.microsoft.com/office/powerpoint/2010/main" val="1758428583"/>
       </p:ext>
     </p:extLst>
   </p:cSld>
@@ -5231,7 +6650,7 @@
           <p:cNvPr id="2" name="Title 1">
             <a:extLst>
               <a:ext uri="{FF2B5EF4-FFF2-40B4-BE49-F238E27FC236}">
-                <a16:creationId xmlns:a16="http://schemas.microsoft.com/office/drawing/2014/main" id="{8C742769-4AB3-404D-AA45-B0FC74F1E218}"/>
+                <a16:creationId xmlns:a16="http://schemas.microsoft.com/office/drawing/2014/main" id="{985620E8-013C-4AB0-BBA5-EF61AB90C269}"/>
               </a:ext>
             </a:extLst>
           </p:cNvPr>
@@ -5247,7 +6666,20 @@
           <a:bodyPr/>
           <a:lstStyle/>
           <a:p>
-            <a:endParaRPr lang="pt-PT"/>
+            <a:pPr algn="ctr"/>
+            <a:r>
+              <a:rPr lang="en-US" b="1" dirty="0" err="1"/>
+              <a:t>Descrição</a:t>
+            </a:r>
+            <a:r>
+              <a:rPr lang="en-US" b="1" dirty="0"/>
+              <a:t> da </a:t>
+            </a:r>
+            <a:r>
+              <a:rPr lang="en-US" b="1" dirty="0" err="1"/>
+              <a:t>Solução</a:t>
+            </a:r>
+            <a:endParaRPr lang="pt-PT" b="1" dirty="0"/>
           </a:p>
         </p:txBody>
       </p:sp>
@@ -5256,7 +6688,7 @@
           <p:cNvPr id="3" name="Content Placeholder 2">
             <a:extLst>
               <a:ext uri="{FF2B5EF4-FFF2-40B4-BE49-F238E27FC236}">
-                <a16:creationId xmlns:a16="http://schemas.microsoft.com/office/drawing/2014/main" id="{FFF57B6D-ACD6-4568-86FC-6D1AD2A8AE64}"/>
+                <a16:creationId xmlns:a16="http://schemas.microsoft.com/office/drawing/2014/main" id="{0DA53B97-5997-490C-B21F-AEAD1D079AC5}"/>
               </a:ext>
             </a:extLst>
           </p:cNvPr>
@@ -5272,14 +6704,14 @@
           <a:bodyPr/>
           <a:lstStyle/>
           <a:p>
-            <a:endParaRPr lang="pt-PT"/>
+            <a:endParaRPr lang="pt-PT" dirty="0"/>
           </a:p>
         </p:txBody>
       </p:sp>
     </p:spTree>
     <p:extLst>
       <p:ext uri="{BB962C8B-B14F-4D97-AF65-F5344CB8AC3E}">
-        <p14:creationId xmlns:p14="http://schemas.microsoft.com/office/powerpoint/2010/main" val="3099424196"/>
+        <p14:creationId xmlns:p14="http://schemas.microsoft.com/office/powerpoint/2010/main" val="470523517"/>
       </p:ext>
     </p:extLst>
   </p:cSld>
@@ -5311,7 +6743,7 @@
           <p:cNvPr id="2" name="Title 1">
             <a:extLst>
               <a:ext uri="{FF2B5EF4-FFF2-40B4-BE49-F238E27FC236}">
-                <a16:creationId xmlns:a16="http://schemas.microsoft.com/office/drawing/2014/main" id="{C8A0825C-84D6-4913-86C4-FEAC7C00EBAE}"/>
+                <a16:creationId xmlns:a16="http://schemas.microsoft.com/office/drawing/2014/main" id="{0D827E17-24D3-4ECC-8AD6-8C29A5AF86BF}"/>
               </a:ext>
             </a:extLst>
           </p:cNvPr>
@@ -5336,7 +6768,7 @@
           <p:cNvPr id="3" name="Content Placeholder 2">
             <a:extLst>
               <a:ext uri="{FF2B5EF4-FFF2-40B4-BE49-F238E27FC236}">
-                <a16:creationId xmlns:a16="http://schemas.microsoft.com/office/drawing/2014/main" id="{6CD805D1-8B45-4B3A-B122-F9CE64ED77B6}"/>
+                <a16:creationId xmlns:a16="http://schemas.microsoft.com/office/drawing/2014/main" id="{ECA0915C-EE2D-4EB4-BF3A-96FCE8158E53}"/>
               </a:ext>
             </a:extLst>
           </p:cNvPr>
@@ -5359,7 +6791,7 @@
     </p:spTree>
     <p:extLst>
       <p:ext uri="{BB962C8B-B14F-4D97-AF65-F5344CB8AC3E}">
-        <p14:creationId xmlns:p14="http://schemas.microsoft.com/office/powerpoint/2010/main" val="373675569"/>
+        <p14:creationId xmlns:p14="http://schemas.microsoft.com/office/powerpoint/2010/main" val="2126801611"/>
       </p:ext>
     </p:extLst>
   </p:cSld>

</xml_diff>

<commit_message>
Pedro is the best
</commit_message>
<xml_diff>
--- a/Presentation/Logística Urbana para Entrega de Mercadorias.pptx
+++ b/Presentation/Logística Urbana para Entrega de Mercadorias.pptx
@@ -651,7 +651,7 @@
           <a:p>
             <a:fld id="{1E434F6B-8EF9-43FF-A859-04EDBF87BDC2}" type="datetimeFigureOut">
               <a:rPr lang="pt-PT" smtClean="0"/>
-              <a:t>18/04/2022</a:t>
+              <a:t>19/04/2022</a:t>
             </a:fld>
             <a:endParaRPr lang="pt-PT"/>
           </a:p>
@@ -1313,7 +1313,7 @@
           <a:p>
             <a:fld id="{B2B3E82F-7782-4578-8D73-D17823895593}" type="datetimeFigureOut">
               <a:rPr lang="pt-PT" smtClean="0"/>
-              <a:t>18/04/2022</a:t>
+              <a:t>19/04/2022</a:t>
             </a:fld>
             <a:endParaRPr lang="pt-PT"/>
           </a:p>
@@ -1521,7 +1521,7 @@
           <a:p>
             <a:fld id="{B2B3E82F-7782-4578-8D73-D17823895593}" type="datetimeFigureOut">
               <a:rPr lang="pt-PT" smtClean="0"/>
-              <a:t>18/04/2022</a:t>
+              <a:t>19/04/2022</a:t>
             </a:fld>
             <a:endParaRPr lang="pt-PT"/>
           </a:p>
@@ -1777,7 +1777,7 @@
           <a:p>
             <a:fld id="{B2B3E82F-7782-4578-8D73-D17823895593}" type="datetimeFigureOut">
               <a:rPr lang="pt-PT" smtClean="0"/>
-              <a:t>18/04/2022</a:t>
+              <a:t>19/04/2022</a:t>
             </a:fld>
             <a:endParaRPr lang="pt-PT"/>
           </a:p>
@@ -1951,7 +1951,7 @@
           <a:p>
             <a:fld id="{B2B3E82F-7782-4578-8D73-D17823895593}" type="datetimeFigureOut">
               <a:rPr lang="pt-PT" smtClean="0"/>
-              <a:t>18/04/2022</a:t>
+              <a:t>19/04/2022</a:t>
             </a:fld>
             <a:endParaRPr lang="pt-PT"/>
           </a:p>
@@ -2294,7 +2294,7 @@
           <a:p>
             <a:fld id="{B2B3E82F-7782-4578-8D73-D17823895593}" type="datetimeFigureOut">
               <a:rPr lang="pt-PT" smtClean="0"/>
-              <a:t>18/04/2022</a:t>
+              <a:t>19/04/2022</a:t>
             </a:fld>
             <a:endParaRPr lang="pt-PT"/>
           </a:p>
@@ -2569,7 +2569,7 @@
           <a:p>
             <a:fld id="{B2B3E82F-7782-4578-8D73-D17823895593}" type="datetimeFigureOut">
               <a:rPr lang="pt-PT" smtClean="0"/>
-              <a:t>18/04/2022</a:t>
+              <a:t>19/04/2022</a:t>
             </a:fld>
             <a:endParaRPr lang="pt-PT"/>
           </a:p>
@@ -2948,7 +2948,7 @@
           <a:p>
             <a:fld id="{B2B3E82F-7782-4578-8D73-D17823895593}" type="datetimeFigureOut">
               <a:rPr lang="pt-PT" smtClean="0"/>
-              <a:t>18/04/2022</a:t>
+              <a:t>19/04/2022</a:t>
             </a:fld>
             <a:endParaRPr lang="pt-PT"/>
           </a:p>
@@ -3066,7 +3066,7 @@
           <a:p>
             <a:fld id="{B2B3E82F-7782-4578-8D73-D17823895593}" type="datetimeFigureOut">
               <a:rPr lang="pt-PT" smtClean="0"/>
-              <a:t>18/04/2022</a:t>
+              <a:t>19/04/2022</a:t>
             </a:fld>
             <a:endParaRPr lang="pt-PT"/>
           </a:p>
@@ -3237,7 +3237,7 @@
           <a:p>
             <a:fld id="{B2B3E82F-7782-4578-8D73-D17823895593}" type="datetimeFigureOut">
               <a:rPr lang="pt-PT" smtClean="0"/>
-              <a:t>18/04/2022</a:t>
+              <a:t>19/04/2022</a:t>
             </a:fld>
             <a:endParaRPr lang="pt-PT"/>
           </a:p>
@@ -3591,7 +3591,7 @@
           <a:p>
             <a:fld id="{B2B3E82F-7782-4578-8D73-D17823895593}" type="datetimeFigureOut">
               <a:rPr lang="pt-PT" smtClean="0"/>
-              <a:t>18/04/2022</a:t>
+              <a:t>19/04/2022</a:t>
             </a:fld>
             <a:endParaRPr lang="pt-PT"/>
           </a:p>
@@ -3973,7 +3973,7 @@
           <a:p>
             <a:fld id="{B2B3E82F-7782-4578-8D73-D17823895593}" type="datetimeFigureOut">
               <a:rPr lang="pt-PT" smtClean="0"/>
-              <a:t>18/04/2022</a:t>
+              <a:t>19/04/2022</a:t>
             </a:fld>
             <a:endParaRPr lang="pt-PT"/>
           </a:p>
@@ -4260,7 +4260,7 @@
           <a:p>
             <a:fld id="{B2B3E82F-7782-4578-8D73-D17823895593}" type="datetimeFigureOut">
               <a:rPr lang="pt-PT" smtClean="0"/>
-              <a:t>18/04/2022</a:t>
+              <a:t>19/04/2022</a:t>
             </a:fld>
             <a:endParaRPr lang="pt-PT"/>
           </a:p>
@@ -5371,7 +5371,14 @@
             <a:pPr lvl="1"/>
             <a:r>
               <a:rPr lang="pt-PT" dirty="0"/>
-              <a:t>Em todos os cenários descobri</a:t>
+              <a:t>Em todos os cenários descobrimos a eficiência das operações da empresa.</a:t>
+            </a:r>
+          </a:p>
+          <a:p>
+            <a:pPr lvl="1"/>
+            <a:r>
+              <a:rPr lang="pt-PT" dirty="0"/>
+              <a:t>Guardamos o número total de encomendas  antes de aplicar o algoritmo numa variável e no final dividimos o tamanho do vetor onde guardamos as estafetas usadas pelo número total de encomendas.</a:t>
             </a:r>
           </a:p>
         </p:txBody>
@@ -6836,8 +6843,8 @@
           </a:p>
         </p:txBody>
       </p:sp>
-      <mc:AlternateContent xmlns:mc="http://schemas.openxmlformats.org/markup-compatibility/2006">
-        <mc:Choice xmlns:a14="http://schemas.microsoft.com/office/drawing/2010/main" Requires="a14">
+      <mc:AlternateContent xmlns:mc="http://schemas.openxmlformats.org/markup-compatibility/2006" xmlns:a14="http://schemas.microsoft.com/office/drawing/2010/main">
+        <mc:Choice Requires="a14">
           <p:sp>
             <p:nvSpPr>
               <p:cNvPr id="7" name="TextBox 6">
@@ -7276,7 +7283,7 @@
             </p:txBody>
           </p:sp>
         </mc:Choice>
-        <mc:Fallback>
+        <mc:Fallback xmlns="">
           <p:sp>
             <p:nvSpPr>
               <p:cNvPr id="7" name="TextBox 6">

</xml_diff>